<commit_message>
modify slide file, add pdf
</commit_message>
<xml_diff>
--- a/2013.11.20-Singleton-Flyweight/singleton_flyweight.pptx
+++ b/2013.11.20-Singleton-Flyweight/singleton_flyweight.pptx
@@ -8,22 +8,21 @@
     <p:sldId id="256" r:id="rId2"/>
     <p:sldId id="257" r:id="rId3"/>
     <p:sldId id="258" r:id="rId4"/>
-    <p:sldId id="261" r:id="rId5"/>
-    <p:sldId id="260" r:id="rId6"/>
-    <p:sldId id="262" r:id="rId7"/>
-    <p:sldId id="263" r:id="rId8"/>
-    <p:sldId id="264" r:id="rId9"/>
-    <p:sldId id="265" r:id="rId10"/>
-    <p:sldId id="266" r:id="rId11"/>
-    <p:sldId id="287" r:id="rId12"/>
-    <p:sldId id="267" r:id="rId13"/>
-    <p:sldId id="268" r:id="rId14"/>
-    <p:sldId id="270" r:id="rId15"/>
-    <p:sldId id="280" r:id="rId16"/>
-    <p:sldId id="286" r:id="rId17"/>
-    <p:sldId id="282" r:id="rId18"/>
-    <p:sldId id="283" r:id="rId19"/>
-    <p:sldId id="285" r:id="rId20"/>
+    <p:sldId id="260" r:id="rId5"/>
+    <p:sldId id="262" r:id="rId6"/>
+    <p:sldId id="263" r:id="rId7"/>
+    <p:sldId id="264" r:id="rId8"/>
+    <p:sldId id="265" r:id="rId9"/>
+    <p:sldId id="266" r:id="rId10"/>
+    <p:sldId id="287" r:id="rId11"/>
+    <p:sldId id="267" r:id="rId12"/>
+    <p:sldId id="268" r:id="rId13"/>
+    <p:sldId id="270" r:id="rId14"/>
+    <p:sldId id="280" r:id="rId15"/>
+    <p:sldId id="286" r:id="rId16"/>
+    <p:sldId id="282" r:id="rId17"/>
+    <p:sldId id="283" r:id="rId18"/>
+    <p:sldId id="285" r:id="rId19"/>
   </p:sldIdLst>
   <p:sldSz cx="9144000" cy="6858000" type="screen4x3"/>
   <p:notesSz cx="6858000" cy="9144000"/>
@@ -371,7 +370,7 @@
             <a:fld id="{1379C713-71FE-4562-9A3D-A2BB3EC08F25}" type="datetimeFigureOut">
               <a:rPr lang="zh-TW" altLang="en-US" smtClean="0"/>
               <a:pPr/>
-              <a:t>2013/11/20</a:t>
+              <a:t>2014/2/8</a:t>
             </a:fld>
             <a:endParaRPr lang="zh-TW" altLang="en-US"/>
           </a:p>
@@ -538,7 +537,7 @@
             <a:fld id="{1379C713-71FE-4562-9A3D-A2BB3EC08F25}" type="datetimeFigureOut">
               <a:rPr lang="zh-TW" altLang="en-US" smtClean="0"/>
               <a:pPr/>
-              <a:t>2013/11/20</a:t>
+              <a:t>2014/2/8</a:t>
             </a:fld>
             <a:endParaRPr lang="zh-TW" altLang="en-US"/>
           </a:p>
@@ -779,7 +778,7 @@
             <a:fld id="{1379C713-71FE-4562-9A3D-A2BB3EC08F25}" type="datetimeFigureOut">
               <a:rPr lang="zh-TW" altLang="en-US" smtClean="0"/>
               <a:pPr/>
-              <a:t>2013/11/20</a:t>
+              <a:t>2014/2/8</a:t>
             </a:fld>
             <a:endParaRPr lang="zh-TW" altLang="en-US"/>
           </a:p>
@@ -1015,7 +1014,7 @@
             <a:fld id="{1379C713-71FE-4562-9A3D-A2BB3EC08F25}" type="datetimeFigureOut">
               <a:rPr lang="zh-TW" altLang="en-US" smtClean="0"/>
               <a:pPr/>
-              <a:t>2013/11/20</a:t>
+              <a:t>2014/2/8</a:t>
             </a:fld>
             <a:endParaRPr lang="zh-TW" altLang="en-US"/>
           </a:p>
@@ -1356,7 +1355,7 @@
             <a:fld id="{1379C713-71FE-4562-9A3D-A2BB3EC08F25}" type="datetimeFigureOut">
               <a:rPr lang="zh-TW" altLang="en-US" smtClean="0"/>
               <a:pPr/>
-              <a:t>2013/11/20</a:t>
+              <a:t>2014/2/8</a:t>
             </a:fld>
             <a:endParaRPr lang="zh-TW" altLang="en-US"/>
           </a:p>
@@ -1705,7 +1704,7 @@
             <a:fld id="{1379C713-71FE-4562-9A3D-A2BB3EC08F25}" type="datetimeFigureOut">
               <a:rPr lang="zh-TW" altLang="en-US" smtClean="0"/>
               <a:pPr/>
-              <a:t>2013/11/20</a:t>
+              <a:t>2014/2/8</a:t>
             </a:fld>
             <a:endParaRPr lang="zh-TW" altLang="en-US"/>
           </a:p>
@@ -2268,7 +2267,7 @@
             <a:fld id="{1379C713-71FE-4562-9A3D-A2BB3EC08F25}" type="datetimeFigureOut">
               <a:rPr lang="zh-TW" altLang="en-US" smtClean="0"/>
               <a:pPr/>
-              <a:t>2013/11/20</a:t>
+              <a:t>2014/2/8</a:t>
             </a:fld>
             <a:endParaRPr lang="zh-TW" altLang="en-US"/>
           </a:p>
@@ -2447,7 +2446,7 @@
             <a:fld id="{1379C713-71FE-4562-9A3D-A2BB3EC08F25}" type="datetimeFigureOut">
               <a:rPr lang="zh-TW" altLang="en-US" smtClean="0"/>
               <a:pPr/>
-              <a:t>2013/11/20</a:t>
+              <a:t>2014/2/8</a:t>
             </a:fld>
             <a:endParaRPr lang="zh-TW" altLang="en-US"/>
           </a:p>
@@ -2544,7 +2543,7 @@
             <a:fld id="{1379C713-71FE-4562-9A3D-A2BB3EC08F25}" type="datetimeFigureOut">
               <a:rPr lang="zh-TW" altLang="en-US" smtClean="0"/>
               <a:pPr/>
-              <a:t>2013/11/20</a:t>
+              <a:t>2014/2/8</a:t>
             </a:fld>
             <a:endParaRPr lang="zh-TW" altLang="en-US"/>
           </a:p>
@@ -2911,7 +2910,7 @@
             <a:fld id="{1379C713-71FE-4562-9A3D-A2BB3EC08F25}" type="datetimeFigureOut">
               <a:rPr lang="zh-TW" altLang="en-US" smtClean="0"/>
               <a:pPr/>
-              <a:t>2013/11/20</a:t>
+              <a:t>2014/2/8</a:t>
             </a:fld>
             <a:endParaRPr lang="zh-TW" altLang="en-US"/>
           </a:p>
@@ -3257,7 +3256,7 @@
             <a:fld id="{1379C713-71FE-4562-9A3D-A2BB3EC08F25}" type="datetimeFigureOut">
               <a:rPr lang="zh-TW" altLang="en-US" smtClean="0"/>
               <a:pPr/>
-              <a:t>2013/11/20</a:t>
+              <a:t>2014/2/8</a:t>
             </a:fld>
             <a:endParaRPr lang="zh-TW" altLang="en-US"/>
           </a:p>
@@ -3530,7 +3529,7 @@
             <a:fld id="{1379C713-71FE-4562-9A3D-A2BB3EC08F25}" type="datetimeFigureOut">
               <a:rPr lang="zh-TW" altLang="en-US" smtClean="0"/>
               <a:pPr/>
-              <a:t>2013/11/20</a:t>
+              <a:t>2014/2/8</a:t>
             </a:fld>
             <a:endParaRPr lang="zh-TW" altLang="en-US"/>
           </a:p>
@@ -4095,7 +4094,7 @@
                 </a:solidFill>
               </a:rPr>
               <a:pPr/>
-              <a:t>2013/11/20</a:t>
+              <a:t>2014/2/8</a:t>
             </a:fld>
             <a:endParaRPr lang="en-US" altLang="zh-TW" dirty="0" smtClean="0">
               <a:solidFill>
@@ -4180,7 +4179,7 @@
         </p:nvGraphicFramePr>
         <p:xfrm>
           <a:off x="457200" y="1600200"/>
-          <a:ext cx="8229600" cy="3139440"/>
+          <a:ext cx="8229600" cy="4450080"/>
         </p:xfrm>
         <a:graphic>
           <a:graphicData uri="http://schemas.openxmlformats.org/drawingml/2006/table">
@@ -4199,73 +4198,143 @@
                     <a:p>
                       <a:r>
                         <a:rPr lang="en-US" altLang="zh-TW" sz="2000" dirty="0" smtClean="0"/>
-                        <a:t>class Singleton {</a:t>
+                        <a:t>Singleton* Singleton::Instance () {</a:t>
                       </a:r>
                     </a:p>
                     <a:p>
                       <a:r>
                         <a:rPr lang="en-US" altLang="zh-TW" sz="2000" dirty="0" smtClean="0"/>
-                        <a:t>  public:</a:t>
+                        <a:t>        if (_instance == 0) {</a:t>
                       </a:r>
                     </a:p>
                     <a:p>
                       <a:r>
                         <a:rPr lang="en-US" altLang="zh-TW" sz="2000" dirty="0" smtClean="0"/>
-                        <a:t>    static void Register(const char* name, Singleton*);</a:t>
+                        <a:t>            const char* </a:t>
+                      </a:r>
+                      <a:r>
+                        <a:rPr lang="en-US" altLang="zh-TW" sz="2000" dirty="0" err="1" smtClean="0"/>
+                        <a:t>singletonName</a:t>
+                      </a:r>
+                      <a:r>
+                        <a:rPr lang="en-US" altLang="zh-TW" sz="2000" dirty="0" smtClean="0"/>
+                        <a:t> = </a:t>
+                      </a:r>
+                      <a:r>
+                        <a:rPr lang="en-US" altLang="zh-TW" sz="2000" dirty="0" err="1" smtClean="0"/>
+                        <a:t>getenv</a:t>
+                      </a:r>
+                      <a:r>
+                        <a:rPr lang="en-US" altLang="zh-TW" sz="2000" dirty="0" smtClean="0"/>
+                        <a:t>("SINGLETON");</a:t>
                       </a:r>
                     </a:p>
                     <a:p>
                       <a:r>
                         <a:rPr lang="en-US" altLang="zh-TW" sz="2000" dirty="0" smtClean="0"/>
-                        <a:t>    static Singleton* Instance();</a:t>
+                        <a:t>            // user or environment supplies this at startup</a:t>
                       </a:r>
                     </a:p>
                     <a:p>
                       <a:r>
                         <a:rPr lang="en-US" altLang="zh-TW" sz="2000" dirty="0" smtClean="0"/>
-                        <a:t>  protected:</a:t>
+                        <a:t>    </a:t>
                       </a:r>
                     </a:p>
                     <a:p>
                       <a:r>
                         <a:rPr lang="en-US" altLang="zh-TW" sz="2000" dirty="0" smtClean="0"/>
-                        <a:t>    static Singleton* Lookup(const char* name);</a:t>
+                        <a:t>            _instance = Lookup(</a:t>
+                      </a:r>
+                      <a:r>
+                        <a:rPr lang="en-US" altLang="zh-TW" sz="2000" dirty="0" err="1" smtClean="0"/>
+                        <a:t>singletonName</a:t>
+                      </a:r>
+                      <a:r>
+                        <a:rPr lang="en-US" altLang="zh-TW" sz="2000" dirty="0" smtClean="0"/>
+                        <a:t>);</a:t>
                       </a:r>
                     </a:p>
                     <a:p>
                       <a:r>
                         <a:rPr lang="en-US" altLang="zh-TW" sz="2000" dirty="0" smtClean="0"/>
-                        <a:t>  private:</a:t>
+                        <a:t>            // Lookup returns 0 if there's no such singleton</a:t>
                       </a:r>
                     </a:p>
                     <a:p>
                       <a:r>
                         <a:rPr lang="en-US" altLang="zh-TW" sz="2000" dirty="0" smtClean="0"/>
-                        <a:t>    static Singleton* _instance;</a:t>
+                        <a:t>        }</a:t>
                       </a:r>
                     </a:p>
                     <a:p>
                       <a:r>
                         <a:rPr lang="en-US" altLang="zh-TW" sz="2000" dirty="0" smtClean="0"/>
-                        <a:t>    static List&lt;</a:t>
-                      </a:r>
-                      <a:r>
-                        <a:rPr lang="en-US" altLang="zh-TW" sz="2000" dirty="0" err="1" smtClean="0"/>
-                        <a:t>NameSingletonPair</a:t>
-                      </a:r>
-                      <a:r>
-                        <a:rPr lang="en-US" altLang="zh-TW" sz="2000" dirty="0" smtClean="0"/>
-                        <a:t>&gt;* _registry;</a:t>
+                        <a:t>        return _instance;</a:t>
                       </a:r>
                     </a:p>
                     <a:p>
                       <a:r>
-                        <a:rPr lang="en-US" altLang="zh-TW" sz="2000" baseline="0" dirty="0" smtClean="0"/>
-                        <a:t>  </a:t>
-                      </a:r>
-                      <a:r>
                         <a:rPr lang="en-US" altLang="zh-TW" sz="2000" dirty="0" smtClean="0"/>
-                        <a:t>};</a:t>
+                        <a:t>    }</a:t>
+                      </a:r>
+                      <a:endParaRPr lang="zh-TW" altLang="en-US" sz="2000" dirty="0"/>
+                    </a:p>
+                  </a:txBody>
+                  <a:tcPr/>
+                </a:tc>
+              </a:tr>
+              <a:tr h="370840">
+                <a:tc>
+                  <a:txBody>
+                    <a:bodyPr/>
+                    <a:lstStyle/>
+                    <a:p>
+                      <a:r>
+                        <a:rPr lang="en-US" altLang="zh-TW" sz="2000" dirty="0" smtClean="0"/>
+                        <a:t> </a:t>
+                      </a:r>
+                      <a:r>
+                        <a:rPr lang="en-US" altLang="zh-TW" sz="2000" dirty="0" err="1" smtClean="0"/>
+                        <a:t>MySingleton</a:t>
+                      </a:r>
+                      <a:r>
+                        <a:rPr lang="en-US" altLang="zh-TW" sz="2000" dirty="0" smtClean="0"/>
+                        <a:t>::</a:t>
+                      </a:r>
+                      <a:r>
+                        <a:rPr lang="en-US" altLang="zh-TW" sz="2000" dirty="0" err="1" smtClean="0"/>
+                        <a:t>MySingleton</a:t>
+                      </a:r>
+                      <a:r>
+                        <a:rPr lang="en-US" altLang="zh-TW" sz="2000" dirty="0" smtClean="0"/>
+                        <a:t>() {</a:t>
+                      </a:r>
+                    </a:p>
+                    <a:p>
+                      <a:r>
+                        <a:rPr lang="en-US" altLang="zh-TW" sz="2000" dirty="0" smtClean="0"/>
+                        <a:t>        // ...</a:t>
+                      </a:r>
+                    </a:p>
+                    <a:p>
+                      <a:r>
+                        <a:rPr lang="en-US" altLang="zh-TW" sz="2000" dirty="0" smtClean="0"/>
+                        <a:t>        Singleton::Register("</a:t>
+                      </a:r>
+                      <a:r>
+                        <a:rPr lang="en-US" altLang="zh-TW" sz="2000" dirty="0" err="1" smtClean="0"/>
+                        <a:t>MySingleton</a:t>
+                      </a:r>
+                      <a:r>
+                        <a:rPr lang="en-US" altLang="zh-TW" sz="2000" dirty="0" smtClean="0"/>
+                        <a:t>", this);</a:t>
+                      </a:r>
+                    </a:p>
+                    <a:p>
+                      <a:r>
+                        <a:rPr lang="en-US" altLang="zh-TW" sz="2000" dirty="0" smtClean="0"/>
+                        <a:t>    }</a:t>
                       </a:r>
                       <a:endParaRPr lang="zh-TW" altLang="en-US" sz="2000" dirty="0"/>
                     </a:p>
@@ -4326,191 +4395,57 @@
           <a:p>
             <a:r>
               <a:rPr lang="en-US" altLang="zh-TW" dirty="0" smtClean="0"/>
-              <a:t>Implementation 2 subclass</a:t>
+              <a:t>Other issue</a:t>
             </a:r>
             <a:endParaRPr lang="zh-TW" altLang="en-US" dirty="0"/>
           </a:p>
         </p:txBody>
       </p:sp>
-      <p:graphicFrame>
-        <p:nvGraphicFramePr>
-          <p:cNvPr id="4" name="內容版面配置區 3"/>
-          <p:cNvGraphicFramePr>
-            <a:graphicFrameLocks noGrp="1"/>
-          </p:cNvGraphicFramePr>
+      <p:sp>
+        <p:nvSpPr>
+          <p:cNvPr id="5" name="內容版面配置區 4"/>
+          <p:cNvSpPr>
+            <a:spLocks noGrp="1"/>
+          </p:cNvSpPr>
           <p:nvPr>
             <p:ph idx="1"/>
           </p:nvPr>
-        </p:nvGraphicFramePr>
-        <p:xfrm>
-          <a:off x="457200" y="1600200"/>
-          <a:ext cx="8229600" cy="4450080"/>
-        </p:xfrm>
-        <a:graphic>
-          <a:graphicData uri="http://schemas.openxmlformats.org/drawingml/2006/table">
-            <a:tbl>
-              <a:tblPr>
-                <a:tableStyleId>{5C22544A-7EE6-4342-B048-85BDC9FD1C3A}</a:tableStyleId>
-              </a:tblPr>
-              <a:tblGrid>
-                <a:gridCol w="8229600"/>
-              </a:tblGrid>
-              <a:tr h="370840">
-                <a:tc>
-                  <a:txBody>
-                    <a:bodyPr/>
-                    <a:lstStyle/>
-                    <a:p>
-                      <a:r>
-                        <a:rPr lang="en-US" altLang="zh-TW" sz="2000" dirty="0" smtClean="0"/>
-                        <a:t>Singleton* Singleton::Instance () {</a:t>
-                      </a:r>
-                    </a:p>
-                    <a:p>
-                      <a:r>
-                        <a:rPr lang="en-US" altLang="zh-TW" sz="2000" dirty="0" smtClean="0"/>
-                        <a:t>        if (_instance == 0) {</a:t>
-                      </a:r>
-                    </a:p>
-                    <a:p>
-                      <a:r>
-                        <a:rPr lang="en-US" altLang="zh-TW" sz="2000" dirty="0" smtClean="0"/>
-                        <a:t>            const char* </a:t>
-                      </a:r>
-                      <a:r>
-                        <a:rPr lang="en-US" altLang="zh-TW" sz="2000" dirty="0" err="1" smtClean="0"/>
-                        <a:t>singletonName</a:t>
-                      </a:r>
-                      <a:r>
-                        <a:rPr lang="en-US" altLang="zh-TW" sz="2000" dirty="0" smtClean="0"/>
-                        <a:t> = </a:t>
-                      </a:r>
-                      <a:r>
-                        <a:rPr lang="en-US" altLang="zh-TW" sz="2000" dirty="0" err="1" smtClean="0"/>
-                        <a:t>getenv</a:t>
-                      </a:r>
-                      <a:r>
-                        <a:rPr lang="en-US" altLang="zh-TW" sz="2000" dirty="0" smtClean="0"/>
-                        <a:t>("SINGLETON");</a:t>
-                      </a:r>
-                    </a:p>
-                    <a:p>
-                      <a:r>
-                        <a:rPr lang="en-US" altLang="zh-TW" sz="2000" dirty="0" smtClean="0"/>
-                        <a:t>            // user or environment supplies this at startup</a:t>
-                      </a:r>
-                    </a:p>
-                    <a:p>
-                      <a:r>
-                        <a:rPr lang="en-US" altLang="zh-TW" sz="2000" dirty="0" smtClean="0"/>
-                        <a:t>    </a:t>
-                      </a:r>
-                    </a:p>
-                    <a:p>
-                      <a:r>
-                        <a:rPr lang="en-US" altLang="zh-TW" sz="2000" dirty="0" smtClean="0"/>
-                        <a:t>            _instance = Lookup(</a:t>
-                      </a:r>
-                      <a:r>
-                        <a:rPr lang="en-US" altLang="zh-TW" sz="2000" dirty="0" err="1" smtClean="0"/>
-                        <a:t>singletonName</a:t>
-                      </a:r>
-                      <a:r>
-                        <a:rPr lang="en-US" altLang="zh-TW" sz="2000" dirty="0" smtClean="0"/>
-                        <a:t>);</a:t>
-                      </a:r>
-                    </a:p>
-                    <a:p>
-                      <a:r>
-                        <a:rPr lang="en-US" altLang="zh-TW" sz="2000" dirty="0" smtClean="0"/>
-                        <a:t>            // Lookup returns 0 if there's no such singleton</a:t>
-                      </a:r>
-                    </a:p>
-                    <a:p>
-                      <a:r>
-                        <a:rPr lang="en-US" altLang="zh-TW" sz="2000" dirty="0" smtClean="0"/>
-                        <a:t>        }</a:t>
-                      </a:r>
-                    </a:p>
-                    <a:p>
-                      <a:r>
-                        <a:rPr lang="en-US" altLang="zh-TW" sz="2000" dirty="0" smtClean="0"/>
-                        <a:t>        return _instance;</a:t>
-                      </a:r>
-                    </a:p>
-                    <a:p>
-                      <a:r>
-                        <a:rPr lang="en-US" altLang="zh-TW" sz="2000" dirty="0" smtClean="0"/>
-                        <a:t>    }</a:t>
-                      </a:r>
-                      <a:endParaRPr lang="zh-TW" altLang="en-US" sz="2000" dirty="0"/>
-                    </a:p>
-                  </a:txBody>
-                  <a:tcPr/>
-                </a:tc>
-              </a:tr>
-              <a:tr h="370840">
-                <a:tc>
-                  <a:txBody>
-                    <a:bodyPr/>
-                    <a:lstStyle/>
-                    <a:p>
-                      <a:r>
-                        <a:rPr lang="en-US" altLang="zh-TW" sz="2000" dirty="0" smtClean="0"/>
-                        <a:t> </a:t>
-                      </a:r>
-                      <a:r>
-                        <a:rPr lang="en-US" altLang="zh-TW" sz="2000" dirty="0" err="1" smtClean="0"/>
-                        <a:t>MySingleton</a:t>
-                      </a:r>
-                      <a:r>
-                        <a:rPr lang="en-US" altLang="zh-TW" sz="2000" dirty="0" smtClean="0"/>
-                        <a:t>::</a:t>
-                      </a:r>
-                      <a:r>
-                        <a:rPr lang="en-US" altLang="zh-TW" sz="2000" dirty="0" err="1" smtClean="0"/>
-                        <a:t>MySingleton</a:t>
-                      </a:r>
-                      <a:r>
-                        <a:rPr lang="en-US" altLang="zh-TW" sz="2000" dirty="0" smtClean="0"/>
-                        <a:t>() {</a:t>
-                      </a:r>
-                    </a:p>
-                    <a:p>
-                      <a:r>
-                        <a:rPr lang="en-US" altLang="zh-TW" sz="2000" dirty="0" smtClean="0"/>
-                        <a:t>        // ...</a:t>
-                      </a:r>
-                    </a:p>
-                    <a:p>
-                      <a:r>
-                        <a:rPr lang="en-US" altLang="zh-TW" sz="2000" dirty="0" smtClean="0"/>
-                        <a:t>        Singleton::Register("</a:t>
-                      </a:r>
-                      <a:r>
-                        <a:rPr lang="en-US" altLang="zh-TW" sz="2000" dirty="0" err="1" smtClean="0"/>
-                        <a:t>MySingleton</a:t>
-                      </a:r>
-                      <a:r>
-                        <a:rPr lang="en-US" altLang="zh-TW" sz="2000" dirty="0" smtClean="0"/>
-                        <a:t>", this);</a:t>
-                      </a:r>
-                    </a:p>
-                    <a:p>
-                      <a:r>
-                        <a:rPr lang="en-US" altLang="zh-TW" sz="2000" dirty="0" smtClean="0"/>
-                        <a:t>    }</a:t>
-                      </a:r>
-                      <a:endParaRPr lang="zh-TW" altLang="en-US" sz="2000" dirty="0"/>
-                    </a:p>
-                  </a:txBody>
-                  <a:tcPr/>
-                </a:tc>
-              </a:tr>
-            </a:tbl>
-          </a:graphicData>
-        </a:graphic>
-      </p:graphicFrame>
+        </p:nvSpPr>
+        <p:spPr>
+          <a:xfrm>
+            <a:off x="457200" y="1600200"/>
+            <a:ext cx="8229600" cy="2404864"/>
+          </a:xfrm>
+        </p:spPr>
+        <p:txBody>
+          <a:bodyPr/>
+          <a:lstStyle/>
+          <a:p>
+            <a:r>
+              <a:rPr lang="en-US" altLang="zh-TW" dirty="0" err="1" smtClean="0"/>
+              <a:t>Metaclass</a:t>
+            </a:r>
+            <a:r>
+              <a:rPr lang="en-US" altLang="zh-TW" dirty="0" smtClean="0"/>
+              <a:t> in many language.</a:t>
+            </a:r>
+          </a:p>
+          <a:p>
+            <a:r>
+              <a:rPr lang="en-US" altLang="zh-TW" dirty="0" smtClean="0"/>
+              <a:t>Relation to other pattern:</a:t>
+            </a:r>
+          </a:p>
+          <a:p>
+            <a:pPr lvl="1"/>
+            <a:r>
+              <a:rPr lang="en-US" altLang="zh-TW" dirty="0" smtClean="0"/>
+              <a:t>Factory, Builder, Prototype</a:t>
+            </a:r>
+            <a:endParaRPr lang="zh-TW" altLang="en-US" dirty="0"/>
+          </a:p>
+        </p:txBody>
+      </p:sp>
     </p:spTree>
   </p:cSld>
   <p:clrMapOvr>
@@ -4550,7 +4485,7 @@
             <a:spLocks noGrp="1"/>
           </p:cNvSpPr>
           <p:nvPr>
-            <p:ph type="title"/>
+            <p:ph type="ctrTitle"/>
           </p:nvPr>
         </p:nvSpPr>
         <p:spPr/>
@@ -4560,7 +4495,7 @@
           <a:p>
             <a:r>
               <a:rPr lang="en-US" altLang="zh-TW" dirty="0" smtClean="0"/>
-              <a:t>Other issue</a:t>
+              <a:t>Flyweight Pattern</a:t>
             </a:r>
             <a:endParaRPr lang="zh-TW" altLang="en-US" dirty="0"/>
           </a:p>
@@ -4568,45 +4503,19 @@
       </p:sp>
       <p:sp>
         <p:nvSpPr>
-          <p:cNvPr id="5" name="內容版面配置區 4"/>
-          <p:cNvSpPr>
-            <a:spLocks noGrp="1"/>
-          </p:cNvSpPr>
-          <p:nvPr>
-            <p:ph idx="1"/>
-          </p:nvPr>
-        </p:nvSpPr>
-        <p:spPr>
-          <a:xfrm>
-            <a:off x="457200" y="1600200"/>
-            <a:ext cx="8229600" cy="2404864"/>
-          </a:xfrm>
-        </p:spPr>
-        <p:txBody>
-          <a:bodyPr/>
-          <a:lstStyle/>
-          <a:p>
-            <a:r>
-              <a:rPr lang="en-US" altLang="zh-TW" dirty="0" err="1" smtClean="0"/>
-              <a:t>Metaclass</a:t>
-            </a:r>
-            <a:r>
-              <a:rPr lang="en-US" altLang="zh-TW" dirty="0" smtClean="0"/>
-              <a:t> in many language.</a:t>
-            </a:r>
-          </a:p>
-          <a:p>
-            <a:r>
-              <a:rPr lang="en-US" altLang="zh-TW" dirty="0" smtClean="0"/>
-              <a:t>Relation to other pattern:</a:t>
-            </a:r>
-          </a:p>
-          <a:p>
-            <a:pPr lvl="1"/>
-            <a:r>
-              <a:rPr lang="en-US" altLang="zh-TW" dirty="0" smtClean="0"/>
-              <a:t>Factory, Builder, Prototype</a:t>
-            </a:r>
+          <p:cNvPr id="4" name="副標題 3"/>
+          <p:cNvSpPr>
+            <a:spLocks noGrp="1"/>
+          </p:cNvSpPr>
+          <p:nvPr>
+            <p:ph type="subTitle" idx="1"/>
+          </p:nvPr>
+        </p:nvSpPr>
+        <p:spPr/>
+        <p:txBody>
+          <a:bodyPr/>
+          <a:lstStyle/>
+          <a:p>
             <a:endParaRPr lang="zh-TW" altLang="en-US" dirty="0"/>
           </a:p>
         </p:txBody>
@@ -4627,80 +4536,6 @@
 </file>
 
 <file path=ppt/slides/slide13.xml><?xml version="1.0" encoding="utf-8"?>
-<p:sld xmlns:a="http://schemas.openxmlformats.org/drawingml/2006/main" xmlns:r="http://schemas.openxmlformats.org/officeDocument/2006/relationships" xmlns:p="http://schemas.openxmlformats.org/presentationml/2006/main">
-  <p:cSld>
-    <p:spTree>
-      <p:nvGrpSpPr>
-        <p:cNvPr id="1" name=""/>
-        <p:cNvGrpSpPr/>
-        <p:nvPr/>
-      </p:nvGrpSpPr>
-      <p:grpSpPr>
-        <a:xfrm>
-          <a:off x="0" y="0"/>
-          <a:ext cx="0" cy="0"/>
-          <a:chOff x="0" y="0"/>
-          <a:chExt cx="0" cy="0"/>
-        </a:xfrm>
-      </p:grpSpPr>
-      <p:sp>
-        <p:nvSpPr>
-          <p:cNvPr id="2" name="標題 1"/>
-          <p:cNvSpPr>
-            <a:spLocks noGrp="1"/>
-          </p:cNvSpPr>
-          <p:nvPr>
-            <p:ph type="ctrTitle"/>
-          </p:nvPr>
-        </p:nvSpPr>
-        <p:spPr/>
-        <p:txBody>
-          <a:bodyPr/>
-          <a:lstStyle/>
-          <a:p>
-            <a:r>
-              <a:rPr lang="en-US" altLang="zh-TW" dirty="0" smtClean="0"/>
-              <a:t>Flyweight Pattern</a:t>
-            </a:r>
-            <a:endParaRPr lang="zh-TW" altLang="en-US" dirty="0"/>
-          </a:p>
-        </p:txBody>
-      </p:sp>
-      <p:sp>
-        <p:nvSpPr>
-          <p:cNvPr id="4" name="副標題 3"/>
-          <p:cNvSpPr>
-            <a:spLocks noGrp="1"/>
-          </p:cNvSpPr>
-          <p:nvPr>
-            <p:ph type="subTitle" idx="1"/>
-          </p:nvPr>
-        </p:nvSpPr>
-        <p:spPr/>
-        <p:txBody>
-          <a:bodyPr/>
-          <a:lstStyle/>
-          <a:p>
-            <a:endParaRPr lang="zh-TW" altLang="en-US" dirty="0"/>
-          </a:p>
-        </p:txBody>
-      </p:sp>
-    </p:spTree>
-  </p:cSld>
-  <p:clrMapOvr>
-    <a:masterClrMapping/>
-  </p:clrMapOvr>
-  <p:timing>
-    <p:tnLst>
-      <p:par>
-        <p:cTn id="1" dur="indefinite" restart="never" nodeType="tmRoot"/>
-      </p:par>
-    </p:tnLst>
-  </p:timing>
-</p:sld>
-</file>
-
-<file path=ppt/slides/slide14.xml><?xml version="1.0" encoding="utf-8"?>
 <p:sld xmlns:a="http://schemas.openxmlformats.org/drawingml/2006/main" xmlns:r="http://schemas.openxmlformats.org/officeDocument/2006/relationships" xmlns:p="http://schemas.openxmlformats.org/presentationml/2006/main">
   <p:cSld>
     <p:spTree>
@@ -5113,7 +4948,7 @@
 </p:sld>
 </file>
 
-<file path=ppt/slides/slide15.xml><?xml version="1.0" encoding="utf-8"?>
+<file path=ppt/slides/slide14.xml><?xml version="1.0" encoding="utf-8"?>
 <p:sld xmlns:a="http://schemas.openxmlformats.org/drawingml/2006/main" xmlns:r="http://schemas.openxmlformats.org/officeDocument/2006/relationships" xmlns:p="http://schemas.openxmlformats.org/presentationml/2006/main">
   <p:cSld>
     <p:spTree>
@@ -5512,7 +5347,7 @@
 </p:sld>
 </file>
 
-<file path=ppt/slides/slide16.xml><?xml version="1.0" encoding="utf-8"?>
+<file path=ppt/slides/slide15.xml><?xml version="1.0" encoding="utf-8"?>
 <p:sld xmlns:a="http://schemas.openxmlformats.org/drawingml/2006/main" xmlns:r="http://schemas.openxmlformats.org/officeDocument/2006/relationships" xmlns:p="http://schemas.openxmlformats.org/presentationml/2006/main">
   <p:cSld>
     <p:spTree>
@@ -5606,6 +5441,97 @@
 </p:sld>
 </file>
 
+<file path=ppt/slides/slide16.xml><?xml version="1.0" encoding="utf-8"?>
+<p:sld xmlns:a="http://schemas.openxmlformats.org/drawingml/2006/main" xmlns:r="http://schemas.openxmlformats.org/officeDocument/2006/relationships" xmlns:p="http://schemas.openxmlformats.org/presentationml/2006/main">
+  <p:cSld>
+    <p:spTree>
+      <p:nvGrpSpPr>
+        <p:cNvPr id="1" name=""/>
+        <p:cNvGrpSpPr/>
+        <p:nvPr/>
+      </p:nvGrpSpPr>
+      <p:grpSpPr>
+        <a:xfrm>
+          <a:off x="0" y="0"/>
+          <a:ext cx="0" cy="0"/>
+          <a:chOff x="0" y="0"/>
+          <a:chExt cx="0" cy="0"/>
+        </a:xfrm>
+      </p:grpSpPr>
+      <p:sp>
+        <p:nvSpPr>
+          <p:cNvPr id="2" name="標題 1"/>
+          <p:cNvSpPr>
+            <a:spLocks noGrp="1"/>
+          </p:cNvSpPr>
+          <p:nvPr>
+            <p:ph type="title"/>
+          </p:nvPr>
+        </p:nvSpPr>
+        <p:spPr/>
+        <p:txBody>
+          <a:bodyPr/>
+          <a:lstStyle/>
+          <a:p>
+            <a:r>
+              <a:rPr lang="en-US" altLang="zh-TW" dirty="0" smtClean="0"/>
+              <a:t>Implementation step</a:t>
+            </a:r>
+            <a:endParaRPr lang="zh-TW" altLang="en-US" dirty="0"/>
+          </a:p>
+        </p:txBody>
+      </p:sp>
+      <p:sp>
+        <p:nvSpPr>
+          <p:cNvPr id="6" name="內容版面配置區 5"/>
+          <p:cNvSpPr>
+            <a:spLocks noGrp="1"/>
+          </p:cNvSpPr>
+          <p:nvPr>
+            <p:ph idx="1"/>
+          </p:nvPr>
+        </p:nvSpPr>
+        <p:spPr/>
+        <p:txBody>
+          <a:bodyPr/>
+          <a:lstStyle/>
+          <a:p>
+            <a:pPr marL="514350" indent="-514350">
+              <a:buFont typeface="+mj-lt"/>
+              <a:buAutoNum type="arabicPeriod"/>
+            </a:pPr>
+            <a:r>
+              <a:rPr lang="en-US" altLang="zh-TW" dirty="0" smtClean="0"/>
+              <a:t>Removing extrinsic state</a:t>
+            </a:r>
+          </a:p>
+          <a:p>
+            <a:pPr marL="514350" indent="-514350">
+              <a:buFont typeface="+mj-lt"/>
+              <a:buAutoNum type="arabicPeriod"/>
+            </a:pPr>
+            <a:r>
+              <a:rPr lang="en-US" altLang="zh-TW" dirty="0" smtClean="0"/>
+              <a:t>Managing shared objects</a:t>
+            </a:r>
+          </a:p>
+        </p:txBody>
+      </p:sp>
+    </p:spTree>
+  </p:cSld>
+  <p:clrMapOvr>
+    <a:masterClrMapping/>
+  </p:clrMapOvr>
+  <p:timing>
+    <p:tnLst>
+      <p:par>
+        <p:cTn id="1" dur="indefinite" restart="never" nodeType="tmRoot"/>
+      </p:par>
+    </p:tnLst>
+  </p:timing>
+</p:sld>
+</file>
+
 <file path=ppt/slides/slide17.xml><?xml version="1.0" encoding="utf-8"?>
 <p:sld xmlns:a="http://schemas.openxmlformats.org/drawingml/2006/main" xmlns:r="http://schemas.openxmlformats.org/officeDocument/2006/relationships" xmlns:p="http://schemas.openxmlformats.org/presentationml/2006/main">
   <p:cSld>
@@ -5640,7 +5566,7 @@
           <a:p>
             <a:r>
               <a:rPr lang="en-US" altLang="zh-TW" dirty="0" smtClean="0"/>
-              <a:t>Implementation step</a:t>
+              <a:t>Related Pattern</a:t>
             </a:r>
             <a:endParaRPr lang="zh-TW" altLang="en-US" dirty="0"/>
           </a:p>
@@ -5656,29 +5582,45 @@
             <p:ph idx="1"/>
           </p:nvPr>
         </p:nvSpPr>
-        <p:spPr/>
-        <p:txBody>
-          <a:bodyPr/>
-          <a:lstStyle/>
-          <a:p>
-            <a:pPr marL="514350" indent="-514350">
-              <a:buFont typeface="+mj-lt"/>
-              <a:buAutoNum type="arabicPeriod"/>
-            </a:pPr>
+        <p:spPr>
+          <a:xfrm>
+            <a:off x="457200" y="1600200"/>
+            <a:ext cx="8229600" cy="4565104"/>
+          </a:xfrm>
+        </p:spPr>
+        <p:txBody>
+          <a:bodyPr/>
+          <a:lstStyle/>
+          <a:p>
             <a:r>
               <a:rPr lang="en-US" altLang="zh-TW" dirty="0" smtClean="0"/>
-              <a:t>Removing extrinsic state</a:t>
-            </a:r>
-          </a:p>
-          <a:p>
-            <a:pPr marL="514350" indent="-514350">
-              <a:buFont typeface="+mj-lt"/>
-              <a:buAutoNum type="arabicPeriod"/>
-            </a:pPr>
+              <a:t>Composite Pattern</a:t>
+            </a:r>
+          </a:p>
+          <a:p>
+            <a:pPr lvl="1"/>
             <a:r>
               <a:rPr lang="en-US" altLang="zh-TW" dirty="0" smtClean="0"/>
-              <a:t>Managing shared objects</a:t>
-            </a:r>
+              <a:t>Manage composite by flyweight</a:t>
+            </a:r>
+          </a:p>
+          <a:p>
+            <a:r>
+              <a:rPr lang="en-US" altLang="zh-TW" dirty="0" smtClean="0"/>
+              <a:t>State, Strategy Pattern</a:t>
+            </a:r>
+          </a:p>
+          <a:p>
+            <a:pPr lvl="1"/>
+            <a:r>
+              <a:rPr lang="en-US" altLang="zh-TW" dirty="0" smtClean="0"/>
+              <a:t>Recommend implement by </a:t>
+            </a:r>
+            <a:r>
+              <a:rPr lang="en-US" altLang="zh-TW" dirty="0" err="1" smtClean="0"/>
+              <a:t>Flyweght</a:t>
+            </a:r>
+            <a:endParaRPr lang="zh-TW" altLang="en-US" dirty="0"/>
           </a:p>
         </p:txBody>
       </p:sp>
@@ -5731,7 +5673,7 @@
           <a:p>
             <a:r>
               <a:rPr lang="en-US" altLang="zh-TW" dirty="0" smtClean="0"/>
-              <a:t>Related Pattern</a:t>
+              <a:t>Other issue</a:t>
             </a:r>
             <a:endParaRPr lang="zh-TW" altLang="en-US" dirty="0"/>
           </a:p>
@@ -5739,7 +5681,7 @@
       </p:sp>
       <p:sp>
         <p:nvSpPr>
-          <p:cNvPr id="6" name="內容版面配置區 5"/>
+          <p:cNvPr id="5" name="內容版面配置區 4"/>
           <p:cNvSpPr>
             <a:spLocks noGrp="1"/>
           </p:cNvSpPr>
@@ -5747,121 +5689,18 @@
             <p:ph idx="1"/>
           </p:nvPr>
         </p:nvSpPr>
-        <p:spPr>
-          <a:xfrm>
-            <a:off x="457200" y="1600200"/>
-            <a:ext cx="8229600" cy="4565104"/>
-          </a:xfrm>
-        </p:spPr>
+        <p:spPr/>
         <p:txBody>
           <a:bodyPr/>
           <a:lstStyle/>
           <a:p>
             <a:r>
               <a:rPr lang="en-US" altLang="zh-TW" dirty="0" smtClean="0"/>
-              <a:t>Composite Pattern</a:t>
-            </a:r>
-          </a:p>
-          <a:p>
-            <a:pPr lvl="1"/>
+              <a:t>.NET pattern: use frequency: </a:t>
+            </a:r>
             <a:r>
               <a:rPr lang="en-US" altLang="zh-TW" dirty="0" smtClean="0"/>
-              <a:t>Manage composite by flyweight</a:t>
-            </a:r>
-          </a:p>
-          <a:p>
-            <a:r>
-              <a:rPr lang="en-US" altLang="zh-TW" dirty="0" smtClean="0"/>
-              <a:t>State, Strategy Pattern</a:t>
-            </a:r>
-          </a:p>
-          <a:p>
-            <a:pPr lvl="1"/>
-            <a:r>
-              <a:rPr lang="en-US" altLang="zh-TW" dirty="0" smtClean="0"/>
-              <a:t>Recommend implement by </a:t>
-            </a:r>
-            <a:r>
-              <a:rPr lang="en-US" altLang="zh-TW" dirty="0" err="1" smtClean="0"/>
-              <a:t>Flyweght</a:t>
-            </a:r>
-            <a:endParaRPr lang="zh-TW" altLang="en-US" dirty="0"/>
-          </a:p>
-        </p:txBody>
-      </p:sp>
-    </p:spTree>
-  </p:cSld>
-  <p:clrMapOvr>
-    <a:masterClrMapping/>
-  </p:clrMapOvr>
-  <p:timing>
-    <p:tnLst>
-      <p:par>
-        <p:cTn id="1" dur="indefinite" restart="never" nodeType="tmRoot"/>
-      </p:par>
-    </p:tnLst>
-  </p:timing>
-</p:sld>
-</file>
-
-<file path=ppt/slides/slide19.xml><?xml version="1.0" encoding="utf-8"?>
-<p:sld xmlns:a="http://schemas.openxmlformats.org/drawingml/2006/main" xmlns:r="http://schemas.openxmlformats.org/officeDocument/2006/relationships" xmlns:p="http://schemas.openxmlformats.org/presentationml/2006/main">
-  <p:cSld>
-    <p:spTree>
-      <p:nvGrpSpPr>
-        <p:cNvPr id="1" name=""/>
-        <p:cNvGrpSpPr/>
-        <p:nvPr/>
-      </p:nvGrpSpPr>
-      <p:grpSpPr>
-        <a:xfrm>
-          <a:off x="0" y="0"/>
-          <a:ext cx="0" cy="0"/>
-          <a:chOff x="0" y="0"/>
-          <a:chExt cx="0" cy="0"/>
-        </a:xfrm>
-      </p:grpSpPr>
-      <p:sp>
-        <p:nvSpPr>
-          <p:cNvPr id="2" name="標題 1"/>
-          <p:cNvSpPr>
-            <a:spLocks noGrp="1"/>
-          </p:cNvSpPr>
-          <p:nvPr>
-            <p:ph type="title"/>
-          </p:nvPr>
-        </p:nvSpPr>
-        <p:spPr/>
-        <p:txBody>
-          <a:bodyPr/>
-          <a:lstStyle/>
-          <a:p>
-            <a:r>
-              <a:rPr lang="en-US" altLang="zh-TW" dirty="0" smtClean="0"/>
-              <a:t>Other issue</a:t>
-            </a:r>
-            <a:endParaRPr lang="zh-TW" altLang="en-US" dirty="0"/>
-          </a:p>
-        </p:txBody>
-      </p:sp>
-      <p:sp>
-        <p:nvSpPr>
-          <p:cNvPr id="5" name="內容版面配置區 4"/>
-          <p:cNvSpPr>
-            <a:spLocks noGrp="1"/>
-          </p:cNvSpPr>
-          <p:nvPr>
-            <p:ph idx="1"/>
-          </p:nvPr>
-        </p:nvSpPr>
-        <p:spPr/>
-        <p:txBody>
-          <a:bodyPr/>
-          <a:lstStyle/>
-          <a:p>
-            <a:r>
-              <a:rPr lang="en-US" altLang="zh-TW" dirty="0" smtClean="0"/>
-              <a:t>.NET pattern: use frequency: low</a:t>
+              <a:t>low</a:t>
             </a:r>
           </a:p>
         </p:txBody>
@@ -6076,456 +5915,6 @@
           <a:lstStyle/>
           <a:p>
             <a:r>
-              <a:rPr lang="zh-TW" altLang="en-US" dirty="0" smtClean="0"/>
-              <a:t>說文解字</a:t>
-            </a:r>
-            <a:endParaRPr lang="zh-TW" altLang="en-US" dirty="0"/>
-          </a:p>
-        </p:txBody>
-      </p:sp>
-      <p:graphicFrame>
-        <p:nvGraphicFramePr>
-          <p:cNvPr id="4" name="內容版面配置區 3"/>
-          <p:cNvGraphicFramePr>
-            <a:graphicFrameLocks noGrp="1"/>
-          </p:cNvGraphicFramePr>
-          <p:nvPr>
-            <p:ph idx="1"/>
-          </p:nvPr>
-        </p:nvGraphicFramePr>
-        <p:xfrm>
-          <a:off x="0" y="1628800"/>
-          <a:ext cx="8948664" cy="2103120"/>
-        </p:xfrm>
-        <a:graphic>
-          <a:graphicData uri="http://schemas.openxmlformats.org/drawingml/2006/table">
-            <a:tbl>
-              <a:tblPr firstRow="1" bandRow="1">
-                <a:tableStyleId>{5C22544A-7EE6-4342-B048-85BDC9FD1C3A}</a:tableStyleId>
-              </a:tblPr>
-              <a:tblGrid>
-                <a:gridCol w="1800894"/>
-                <a:gridCol w="2975389"/>
-                <a:gridCol w="4172381"/>
-              </a:tblGrid>
-              <a:tr h="370840">
-                <a:tc>
-                  <a:txBody>
-                    <a:bodyPr/>
-                    <a:lstStyle/>
-                    <a:p>
-                      <a:r>
-                        <a:rPr lang="en-US" altLang="zh-TW" sz="3600" dirty="0" smtClean="0"/>
-                        <a:t>Word</a:t>
-                      </a:r>
-                      <a:endParaRPr lang="zh-TW" altLang="en-US" sz="3600" dirty="0"/>
-                    </a:p>
-                  </a:txBody>
-                  <a:tcPr/>
-                </a:tc>
-                <a:tc>
-                  <a:txBody>
-                    <a:bodyPr/>
-                    <a:lstStyle/>
-                    <a:p>
-                      <a:r>
-                        <a:rPr lang="en-US" altLang="zh-TW" sz="3600" dirty="0" smtClean="0"/>
-                        <a:t>Translation</a:t>
-                      </a:r>
-                      <a:endParaRPr lang="zh-TW" altLang="en-US" sz="3600" dirty="0"/>
-                    </a:p>
-                  </a:txBody>
-                  <a:tcPr/>
-                </a:tc>
-                <a:tc>
-                  <a:txBody>
-                    <a:bodyPr/>
-                    <a:lstStyle/>
-                    <a:p>
-                      <a:r>
-                        <a:rPr lang="en-US" altLang="zh-TW" sz="3600" dirty="0" smtClean="0"/>
-                        <a:t>Example</a:t>
-                      </a:r>
-                      <a:endParaRPr lang="zh-TW" altLang="en-US" sz="3600" dirty="0"/>
-                    </a:p>
-                  </a:txBody>
-                  <a:tcPr/>
-                </a:tc>
-              </a:tr>
-              <a:tr h="370840">
-                <a:tc>
-                  <a:txBody>
-                    <a:bodyPr/>
-                    <a:lstStyle/>
-                    <a:p>
-                      <a:r>
-                        <a:rPr lang="en-US" altLang="zh-TW" sz="2800" dirty="0" smtClean="0"/>
-                        <a:t>Single</a:t>
-                      </a:r>
-                      <a:endParaRPr lang="zh-TW" altLang="en-US" sz="2800" dirty="0"/>
-                    </a:p>
-                  </a:txBody>
-                  <a:tcPr/>
-                </a:tc>
-                <a:tc>
-                  <a:txBody>
-                    <a:bodyPr/>
-                    <a:lstStyle/>
-                    <a:p>
-                      <a:r>
-                        <a:rPr lang="zh-TW" altLang="en-US" sz="2800" dirty="0" smtClean="0"/>
-                        <a:t>單一的、單身的</a:t>
-                      </a:r>
-                      <a:endParaRPr lang="zh-TW" altLang="en-US" sz="2800" dirty="0"/>
-                    </a:p>
-                  </a:txBody>
-                  <a:tcPr/>
-                </a:tc>
-                <a:tc>
-                  <a:txBody>
-                    <a:bodyPr/>
-                    <a:lstStyle/>
-                    <a:p>
-                      <a:endParaRPr lang="en-US" altLang="zh-TW" sz="2800" dirty="0" smtClean="0"/>
-                    </a:p>
-                    <a:p>
-                      <a:endParaRPr lang="zh-TW" altLang="en-US" sz="2800" dirty="0"/>
-                    </a:p>
-                  </a:txBody>
-                  <a:tcPr/>
-                </a:tc>
-              </a:tr>
-              <a:tr h="370840">
-                <a:tc>
-                  <a:txBody>
-                    <a:bodyPr/>
-                    <a:lstStyle/>
-                    <a:p>
-                      <a:r>
-                        <a:rPr lang="en-US" altLang="zh-TW" sz="2800" dirty="0" smtClean="0"/>
-                        <a:t>Singleton</a:t>
-                      </a:r>
-                      <a:endParaRPr lang="zh-TW" altLang="en-US" sz="2800" dirty="0"/>
-                    </a:p>
-                  </a:txBody>
-                  <a:tcPr/>
-                </a:tc>
-                <a:tc>
-                  <a:txBody>
-                    <a:bodyPr/>
-                    <a:lstStyle/>
-                    <a:p>
-                      <a:r>
-                        <a:rPr lang="zh-TW" altLang="en-US" sz="2800" dirty="0" smtClean="0"/>
-                        <a:t>獨身</a:t>
-                      </a:r>
-                      <a:endParaRPr lang="zh-TW" altLang="en-US" sz="2800" dirty="0"/>
-                    </a:p>
-                  </a:txBody>
-                  <a:tcPr/>
-                </a:tc>
-                <a:tc>
-                  <a:txBody>
-                    <a:bodyPr/>
-                    <a:lstStyle/>
-                    <a:p>
-                      <a:endParaRPr lang="zh-TW" altLang="en-US" sz="2800" dirty="0"/>
-                    </a:p>
-                  </a:txBody>
-                  <a:tcPr/>
-                </a:tc>
-              </a:tr>
-            </a:tbl>
-          </a:graphicData>
-        </a:graphic>
-      </p:graphicFrame>
-      <p:sp>
-        <p:nvSpPr>
-          <p:cNvPr id="6" name="文字方塊 5"/>
-          <p:cNvSpPr txBox="1"/>
-          <p:nvPr/>
-        </p:nvSpPr>
-        <p:spPr>
-          <a:xfrm>
-            <a:off x="4860032" y="2276872"/>
-            <a:ext cx="3082895" cy="954107"/>
-          </a:xfrm>
-          <a:prstGeom prst="rect">
-            <a:avLst/>
-          </a:prstGeom>
-          <a:noFill/>
-        </p:spPr>
-        <p:txBody>
-          <a:bodyPr wrap="none" rtlCol="0">
-            <a:spAutoFit/>
-          </a:bodyPr>
-          <a:lstStyle/>
-          <a:p>
-            <a:r>
-              <a:rPr lang="en-US" altLang="zh-TW" sz="2800" dirty="0" smtClean="0">
-                <a:solidFill>
-                  <a:schemeClr val="dk1"/>
-                </a:solidFill>
-              </a:rPr>
-              <a:t>QCL is still single </a:t>
-            </a:r>
-            <a:endParaRPr lang="en-US" altLang="zh-TW" sz="2800" dirty="0" smtClean="0">
-              <a:solidFill>
-                <a:schemeClr val="dk1"/>
-              </a:solidFill>
-            </a:endParaRPr>
-          </a:p>
-          <a:p>
-            <a:r>
-              <a:rPr lang="en-US" altLang="zh-TW" sz="2800" dirty="0" smtClean="0">
-                <a:solidFill>
-                  <a:schemeClr val="dk1"/>
-                </a:solidFill>
-              </a:rPr>
-              <a:t>(</a:t>
-            </a:r>
-            <a:r>
-              <a:rPr lang="zh-TW" altLang="en-US" sz="2800" dirty="0" smtClean="0">
-                <a:solidFill>
-                  <a:schemeClr val="dk1"/>
-                </a:solidFill>
-              </a:rPr>
-              <a:t>無誤</a:t>
-            </a:r>
-            <a:r>
-              <a:rPr lang="en-US" altLang="zh-TW" sz="2800" dirty="0" smtClean="0">
-                <a:solidFill>
-                  <a:schemeClr val="dk1"/>
-                </a:solidFill>
-              </a:rPr>
-              <a:t>)</a:t>
-            </a:r>
-            <a:endParaRPr lang="zh-TW" altLang="en-US" dirty="0"/>
-          </a:p>
-        </p:txBody>
-      </p:sp>
-      <p:sp>
-        <p:nvSpPr>
-          <p:cNvPr id="7" name="文字方塊 6"/>
-          <p:cNvSpPr txBox="1"/>
-          <p:nvPr/>
-        </p:nvSpPr>
-        <p:spPr>
-          <a:xfrm>
-            <a:off x="4860032" y="3212976"/>
-            <a:ext cx="4080220" cy="800219"/>
-          </a:xfrm>
-          <a:prstGeom prst="rect">
-            <a:avLst/>
-          </a:prstGeom>
-          <a:noFill/>
-        </p:spPr>
-        <p:txBody>
-          <a:bodyPr wrap="square" rtlCol="0">
-            <a:spAutoFit/>
-          </a:bodyPr>
-          <a:lstStyle/>
-          <a:p>
-            <a:r>
-              <a:rPr lang="en-US" altLang="zh-TW" sz="2800" dirty="0" smtClean="0">
-                <a:solidFill>
-                  <a:schemeClr val="dk1"/>
-                </a:solidFill>
-              </a:rPr>
-              <a:t>QCL itself is a singleton</a:t>
-            </a:r>
-            <a:endParaRPr lang="zh-TW" altLang="en-US" sz="2800" dirty="0" smtClean="0">
-              <a:solidFill>
-                <a:schemeClr val="dk1"/>
-              </a:solidFill>
-            </a:endParaRPr>
-          </a:p>
-          <a:p>
-            <a:endParaRPr lang="zh-TW" altLang="en-US" dirty="0"/>
-          </a:p>
-        </p:txBody>
-      </p:sp>
-    </p:spTree>
-  </p:cSld>
-  <p:clrMapOvr>
-    <a:masterClrMapping/>
-  </p:clrMapOvr>
-  <p:timing>
-    <p:tnLst>
-      <p:par>
-        <p:cTn id="1" dur="indefinite" restart="never" nodeType="tmRoot">
-          <p:childTnLst>
-            <p:seq concurrent="1" nextAc="seek">
-              <p:cTn id="2" dur="indefinite" nodeType="mainSeq">
-                <p:childTnLst>
-                  <p:par>
-                    <p:cTn id="3" fill="hold">
-                      <p:stCondLst>
-                        <p:cond delay="indefinite"/>
-                      </p:stCondLst>
-                      <p:childTnLst>
-                        <p:par>
-                          <p:cTn id="4" fill="hold">
-                            <p:stCondLst>
-                              <p:cond delay="0"/>
-                            </p:stCondLst>
-                            <p:childTnLst>
-                              <p:par>
-                                <p:cTn id="5" presetID="3" presetClass="entr" presetSubtype="10" fill="hold" grpId="1" nodeType="clickEffect">
-                                  <p:stCondLst>
-                                    <p:cond delay="0"/>
-                                  </p:stCondLst>
-                                  <p:childTnLst>
-                                    <p:set>
-                                      <p:cBhvr>
-                                        <p:cTn id="6" dur="1" fill="hold">
-                                          <p:stCondLst>
-                                            <p:cond delay="0"/>
-                                          </p:stCondLst>
-                                        </p:cTn>
-                                        <p:tgtEl>
-                                          <p:spTgt spid="6"/>
-                                        </p:tgtEl>
-                                        <p:attrNameLst>
-                                          <p:attrName>style.visibility</p:attrName>
-                                        </p:attrNameLst>
-                                      </p:cBhvr>
-                                      <p:to>
-                                        <p:strVal val="visible"/>
-                                      </p:to>
-                                    </p:set>
-                                    <p:animEffect transition="in" filter="blinds(horizontal)">
-                                      <p:cBhvr>
-                                        <p:cTn id="7" dur="500"/>
-                                        <p:tgtEl>
-                                          <p:spTgt spid="6"/>
-                                        </p:tgtEl>
-                                      </p:cBhvr>
-                                    </p:animEffect>
-                                  </p:childTnLst>
-                                </p:cTn>
-                              </p:par>
-                            </p:childTnLst>
-                          </p:cTn>
-                        </p:par>
-                      </p:childTnLst>
-                    </p:cTn>
-                  </p:par>
-                  <p:par>
-                    <p:cTn id="8" fill="hold">
-                      <p:stCondLst>
-                        <p:cond delay="indefinite"/>
-                      </p:stCondLst>
-                      <p:childTnLst>
-                        <p:par>
-                          <p:cTn id="9" fill="hold">
-                            <p:stCondLst>
-                              <p:cond delay="0"/>
-                            </p:stCondLst>
-                            <p:childTnLst>
-                              <p:par>
-                                <p:cTn id="10" presetID="3" presetClass="entr" presetSubtype="10" fill="hold" grpId="0" nodeType="clickEffect">
-                                  <p:stCondLst>
-                                    <p:cond delay="0"/>
-                                  </p:stCondLst>
-                                  <p:childTnLst>
-                                    <p:set>
-                                      <p:cBhvr>
-                                        <p:cTn id="11" dur="1" fill="hold">
-                                          <p:stCondLst>
-                                            <p:cond delay="0"/>
-                                          </p:stCondLst>
-                                        </p:cTn>
-                                        <p:tgtEl>
-                                          <p:spTgt spid="7"/>
-                                        </p:tgtEl>
-                                        <p:attrNameLst>
-                                          <p:attrName>style.visibility</p:attrName>
-                                        </p:attrNameLst>
-                                      </p:cBhvr>
-                                      <p:to>
-                                        <p:strVal val="visible"/>
-                                      </p:to>
-                                    </p:set>
-                                    <p:animEffect transition="in" filter="blinds(horizontal)">
-                                      <p:cBhvr>
-                                        <p:cTn id="12" dur="1000"/>
-                                        <p:tgtEl>
-                                          <p:spTgt spid="7"/>
-                                        </p:tgtEl>
-                                      </p:cBhvr>
-                                    </p:animEffect>
-                                  </p:childTnLst>
-                                </p:cTn>
-                              </p:par>
-                            </p:childTnLst>
-                          </p:cTn>
-                        </p:par>
-                      </p:childTnLst>
-                    </p:cTn>
-                  </p:par>
-                </p:childTnLst>
-              </p:cTn>
-              <p:prevCondLst>
-                <p:cond evt="onPrev" delay="0">
-                  <p:tgtEl>
-                    <p:sldTgt/>
-                  </p:tgtEl>
-                </p:cond>
-              </p:prevCondLst>
-              <p:nextCondLst>
-                <p:cond evt="onNext" delay="0">
-                  <p:tgtEl>
-                    <p:sldTgt/>
-                  </p:tgtEl>
-                </p:cond>
-              </p:nextCondLst>
-            </p:seq>
-          </p:childTnLst>
-        </p:cTn>
-      </p:par>
-    </p:tnLst>
-    <p:bldLst>
-      <p:bldP spid="6" grpId="1"/>
-      <p:bldP spid="7" grpId="0"/>
-    </p:bldLst>
-  </p:timing>
-</p:sld>
-</file>
-
-<file path=ppt/slides/slide5.xml><?xml version="1.0" encoding="utf-8"?>
-<p:sld xmlns:a="http://schemas.openxmlformats.org/drawingml/2006/main" xmlns:r="http://schemas.openxmlformats.org/officeDocument/2006/relationships" xmlns:p="http://schemas.openxmlformats.org/presentationml/2006/main">
-  <p:cSld>
-    <p:spTree>
-      <p:nvGrpSpPr>
-        <p:cNvPr id="1" name=""/>
-        <p:cNvGrpSpPr/>
-        <p:nvPr/>
-      </p:nvGrpSpPr>
-      <p:grpSpPr>
-        <a:xfrm>
-          <a:off x="0" y="0"/>
-          <a:ext cx="0" cy="0"/>
-          <a:chOff x="0" y="0"/>
-          <a:chExt cx="0" cy="0"/>
-        </a:xfrm>
-      </p:grpSpPr>
-      <p:sp>
-        <p:nvSpPr>
-          <p:cNvPr id="2" name="標題 1"/>
-          <p:cNvSpPr>
-            <a:spLocks noGrp="1"/>
-          </p:cNvSpPr>
-          <p:nvPr>
-            <p:ph type="title"/>
-          </p:nvPr>
-        </p:nvSpPr>
-        <p:spPr/>
-        <p:txBody>
-          <a:bodyPr/>
-          <a:lstStyle/>
-          <a:p>
-            <a:r>
               <a:rPr lang="en-US" altLang="zh-TW" dirty="0" smtClean="0"/>
               <a:t>Definition</a:t>
             </a:r>
@@ -6567,11 +5956,7 @@
             <a:pPr lvl="1"/>
             <a:r>
               <a:rPr lang="en-US" altLang="zh-TW" dirty="0" smtClean="0"/>
-              <a:t>Ensure a class only has one instance, and provide a global point of access to </a:t>
-            </a:r>
-            <a:r>
-              <a:rPr lang="en-US" altLang="zh-TW" dirty="0" smtClean="0"/>
-              <a:t>it.</a:t>
+              <a:t>Ensure a class only has one instance, and provide a global point of access to it.</a:t>
             </a:r>
           </a:p>
         </p:txBody>
@@ -6704,7 +6089,7 @@
 </p:sld>
 </file>
 
-<file path=ppt/slides/slide6.xml><?xml version="1.0" encoding="utf-8"?>
+<file path=ppt/slides/slide5.xml><?xml version="1.0" encoding="utf-8"?>
 <p:sld xmlns:a="http://schemas.openxmlformats.org/drawingml/2006/main" xmlns:r="http://schemas.openxmlformats.org/officeDocument/2006/relationships" xmlns:p="http://schemas.openxmlformats.org/presentationml/2006/main">
   <p:cSld>
     <p:spTree>
@@ -6798,7 +6183,7 @@
 </p:sld>
 </file>
 
-<file path=ppt/slides/slide7.xml><?xml version="1.0" encoding="utf-8"?>
+<file path=ppt/slides/slide6.xml><?xml version="1.0" encoding="utf-8"?>
 <p:sld xmlns:a="http://schemas.openxmlformats.org/drawingml/2006/main" xmlns:r="http://schemas.openxmlformats.org/officeDocument/2006/relationships" xmlns:p="http://schemas.openxmlformats.org/presentationml/2006/main">
   <p:cSld>
     <p:spTree>
@@ -6956,7 +6341,7 @@
         </p:nvGraphicFramePr>
         <p:xfrm>
           <a:off x="1403648" y="4149080"/>
-          <a:ext cx="7560840" cy="1889760"/>
+          <a:ext cx="7560840" cy="2316480"/>
         </p:xfrm>
         <a:graphic>
           <a:graphicData uri="http://schemas.openxmlformats.org/drawingml/2006/table">
@@ -6965,8 +6350,8 @@
                 <a:tableStyleId>{5C22544A-7EE6-4342-B048-85BDC9FD1C3A}</a:tableStyleId>
               </a:tblPr>
               <a:tblGrid>
-                <a:gridCol w="1656184"/>
-                <a:gridCol w="5904656"/>
+                <a:gridCol w="1872208"/>
+                <a:gridCol w="5688632"/>
               </a:tblGrid>
               <a:tr h="370840">
                 <a:tc>
@@ -7116,7 +6501,42 @@
                       </a:pPr>
                       <a:r>
                         <a:rPr lang="en-US" altLang="zh-TW" sz="2800" dirty="0" smtClean="0"/>
-                        <a:t>    QCL-&gt;homework())  //safety</a:t>
+                        <a:t>    QCL-&gt;homework</a:t>
+                      </a:r>
+                      <a:r>
+                        <a:rPr lang="en-US" altLang="zh-TW" sz="2800" dirty="0" smtClean="0"/>
+                        <a:t>())</a:t>
+                      </a:r>
+                    </a:p>
+                    <a:p>
+                      <a:pPr marL="0" marR="0" indent="0" algn="l" defTabSz="914400" rtl="0" eaLnBrk="1" fontAlgn="auto" latinLnBrk="0" hangingPunct="1">
+                        <a:lnSpc>
+                          <a:spcPct val="100000"/>
+                        </a:lnSpc>
+                        <a:spcBef>
+                          <a:spcPts val="0"/>
+                        </a:spcBef>
+                        <a:spcAft>
+                          <a:spcPts val="0"/>
+                        </a:spcAft>
+                        <a:buClrTx/>
+                        <a:buSzTx/>
+                        <a:buFontTx/>
+                        <a:buNone/>
+                        <a:tabLst/>
+                        <a:defRPr/>
+                      </a:pPr>
+                      <a:r>
+                        <a:rPr lang="en-US" altLang="zh-TW" sz="2800" dirty="0" smtClean="0"/>
+                        <a:t>  </a:t>
+                      </a:r>
+                      <a:r>
+                        <a:rPr lang="en-US" altLang="zh-TW" sz="2800" dirty="0" smtClean="0"/>
+                        <a:t>//</a:t>
+                      </a:r>
+                      <a:r>
+                        <a:rPr lang="en-US" altLang="zh-TW" sz="2800" dirty="0" smtClean="0"/>
+                        <a:t>safety, prevent plagiarism</a:t>
                       </a:r>
                       <a:endParaRPr lang="zh-TW" altLang="en-US" sz="2800" dirty="0" smtClean="0"/>
                     </a:p>
@@ -7128,6 +6548,95 @@
           </a:graphicData>
         </a:graphic>
       </p:graphicFrame>
+    </p:spTree>
+  </p:cSld>
+  <p:clrMapOvr>
+    <a:masterClrMapping/>
+  </p:clrMapOvr>
+  <p:timing>
+    <p:tnLst>
+      <p:par>
+        <p:cTn id="1" dur="indefinite" restart="never" nodeType="tmRoot"/>
+      </p:par>
+    </p:tnLst>
+  </p:timing>
+</p:sld>
+</file>
+
+<file path=ppt/slides/slide7.xml><?xml version="1.0" encoding="utf-8"?>
+<p:sld xmlns:a="http://schemas.openxmlformats.org/drawingml/2006/main" xmlns:r="http://schemas.openxmlformats.org/officeDocument/2006/relationships" xmlns:p="http://schemas.openxmlformats.org/presentationml/2006/main">
+  <p:cSld>
+    <p:spTree>
+      <p:nvGrpSpPr>
+        <p:cNvPr id="1" name=""/>
+        <p:cNvGrpSpPr/>
+        <p:nvPr/>
+      </p:nvGrpSpPr>
+      <p:grpSpPr>
+        <a:xfrm>
+          <a:off x="0" y="0"/>
+          <a:ext cx="0" cy="0"/>
+          <a:chOff x="0" y="0"/>
+          <a:chExt cx="0" cy="0"/>
+        </a:xfrm>
+      </p:grpSpPr>
+      <p:sp>
+        <p:nvSpPr>
+          <p:cNvPr id="2" name="標題 1"/>
+          <p:cNvSpPr>
+            <a:spLocks noGrp="1"/>
+          </p:cNvSpPr>
+          <p:nvPr>
+            <p:ph type="title"/>
+          </p:nvPr>
+        </p:nvSpPr>
+        <p:spPr/>
+        <p:txBody>
+          <a:bodyPr/>
+          <a:lstStyle/>
+          <a:p>
+            <a:r>
+              <a:rPr lang="en-US" altLang="zh-TW" dirty="0" smtClean="0"/>
+              <a:t>Benefit of Singleton (cont.)</a:t>
+            </a:r>
+            <a:endParaRPr lang="zh-TW" altLang="en-US" dirty="0"/>
+          </a:p>
+        </p:txBody>
+      </p:sp>
+      <p:sp>
+        <p:nvSpPr>
+          <p:cNvPr id="6" name="內容版面配置區 5"/>
+          <p:cNvSpPr>
+            <a:spLocks noGrp="1"/>
+          </p:cNvSpPr>
+          <p:nvPr>
+            <p:ph idx="1"/>
+          </p:nvPr>
+        </p:nvSpPr>
+        <p:spPr/>
+        <p:txBody>
+          <a:bodyPr/>
+          <a:lstStyle/>
+          <a:p>
+            <a:r>
+              <a:rPr lang="en-US" altLang="zh-TW" dirty="0" smtClean="0"/>
+              <a:t>Permits refinement of operations and representation</a:t>
+            </a:r>
+          </a:p>
+          <a:p>
+            <a:r>
+              <a:rPr lang="en-US" altLang="zh-TW" dirty="0" smtClean="0"/>
+              <a:t>Permits a variable number of instances</a:t>
+            </a:r>
+          </a:p>
+          <a:p>
+            <a:r>
+              <a:rPr lang="en-US" altLang="zh-TW" dirty="0" smtClean="0"/>
+              <a:t>More flexible than class operations</a:t>
+            </a:r>
+          </a:p>
+        </p:txBody>
+      </p:sp>
     </p:spTree>
   </p:cSld>
   <p:clrMapOvr>
@@ -7177,46 +6686,237 @@
           <a:p>
             <a:r>
               <a:rPr lang="en-US" altLang="zh-TW" dirty="0" smtClean="0"/>
-              <a:t>Benefit of Singleton (cont.)</a:t>
+              <a:t>Implementation 1</a:t>
             </a:r>
             <a:endParaRPr lang="zh-TW" altLang="en-US" dirty="0"/>
           </a:p>
         </p:txBody>
       </p:sp>
-      <p:sp>
-        <p:nvSpPr>
-          <p:cNvPr id="6" name="內容版面配置區 5"/>
-          <p:cNvSpPr>
-            <a:spLocks noGrp="1"/>
-          </p:cNvSpPr>
+      <p:graphicFrame>
+        <p:nvGraphicFramePr>
+          <p:cNvPr id="4" name="內容版面配置區 3"/>
+          <p:cNvGraphicFramePr>
+            <a:graphicFrameLocks noGrp="1"/>
+          </p:cNvGraphicFramePr>
           <p:nvPr>
             <p:ph idx="1"/>
           </p:nvPr>
-        </p:nvSpPr>
-        <p:spPr/>
-        <p:txBody>
-          <a:bodyPr/>
-          <a:lstStyle/>
-          <a:p>
-            <a:r>
-              <a:rPr lang="en-US" altLang="zh-TW" dirty="0" smtClean="0"/>
-              <a:t>Permits refinement of operations and representation</a:t>
-            </a:r>
-          </a:p>
-          <a:p>
-            <a:r>
-              <a:rPr lang="en-US" altLang="zh-TW" dirty="0" smtClean="0"/>
-              <a:t>Permits a variable number of instances</a:t>
-            </a:r>
-          </a:p>
-          <a:p>
-            <a:r>
-              <a:rPr lang="en-US" altLang="zh-TW" dirty="0" smtClean="0"/>
-              <a:t>More flexible than class operations</a:t>
-            </a:r>
-          </a:p>
-        </p:txBody>
-      </p:sp>
+        </p:nvGraphicFramePr>
+        <p:xfrm>
+          <a:off x="323528" y="1600200"/>
+          <a:ext cx="8568952" cy="3139440"/>
+        </p:xfrm>
+        <a:graphic>
+          <a:graphicData uri="http://schemas.openxmlformats.org/drawingml/2006/table">
+            <a:tbl>
+              <a:tblPr>
+                <a:tableStyleId>{5C22544A-7EE6-4342-B048-85BDC9FD1C3A}</a:tableStyleId>
+              </a:tblPr>
+              <a:tblGrid>
+                <a:gridCol w="4284476"/>
+                <a:gridCol w="4284476"/>
+              </a:tblGrid>
+              <a:tr h="370840">
+                <a:tc>
+                  <a:txBody>
+                    <a:bodyPr/>
+                    <a:lstStyle/>
+                    <a:p>
+                      <a:r>
+                        <a:rPr lang="en-US" altLang="zh-TW" sz="2000" dirty="0" smtClean="0"/>
+                        <a:t>class Singleton {</a:t>
+                      </a:r>
+                    </a:p>
+                    <a:p>
+                      <a:r>
+                        <a:rPr lang="en-US" altLang="zh-TW" sz="2000" dirty="0" smtClean="0"/>
+                        <a:t>    public:</a:t>
+                      </a:r>
+                    </a:p>
+                    <a:p>
+                      <a:r>
+                        <a:rPr lang="en-US" altLang="zh-TW" sz="2000" dirty="0" smtClean="0"/>
+                        <a:t>        static Singleton* Instance();</a:t>
+                      </a:r>
+                    </a:p>
+                    <a:p>
+                      <a:r>
+                        <a:rPr lang="en-US" altLang="zh-TW" sz="2000" dirty="0" smtClean="0"/>
+                        <a:t>    protected:</a:t>
+                      </a:r>
+                    </a:p>
+                    <a:p>
+                      <a:r>
+                        <a:rPr lang="en-US" altLang="zh-TW" sz="2000" dirty="0" smtClean="0"/>
+                        <a:t>        Singleton();</a:t>
+                      </a:r>
+                    </a:p>
+                    <a:p>
+                      <a:r>
+                        <a:rPr lang="en-US" altLang="zh-TW" sz="2000" dirty="0" smtClean="0"/>
+                        <a:t>    private:</a:t>
+                      </a:r>
+                    </a:p>
+                    <a:p>
+                      <a:r>
+                        <a:rPr lang="en-US" altLang="zh-TW" sz="2000" dirty="0" smtClean="0"/>
+                        <a:t>        static Singleton* _instance;</a:t>
+                      </a:r>
+                    </a:p>
+                    <a:p>
+                      <a:r>
+                        <a:rPr lang="en-US" altLang="zh-TW" sz="2000" dirty="0" smtClean="0"/>
+                        <a:t>    };</a:t>
+                      </a:r>
+                      <a:endParaRPr lang="zh-TW" altLang="en-US" sz="2000" dirty="0"/>
+                    </a:p>
+                  </a:txBody>
+                  <a:tcPr/>
+                </a:tc>
+                <a:tc>
+                  <a:txBody>
+                    <a:bodyPr/>
+                    <a:lstStyle/>
+                    <a:p>
+                      <a:r>
+                        <a:rPr lang="en-US" altLang="zh-TW" sz="2000" dirty="0" smtClean="0"/>
+                        <a:t> Singleton* Singleton::_instance = 0;</a:t>
+                      </a:r>
+                    </a:p>
+                    <a:p>
+                      <a:r>
+                        <a:rPr lang="en-US" altLang="zh-TW" sz="2000" dirty="0" smtClean="0"/>
+                        <a:t>    </a:t>
+                      </a:r>
+                    </a:p>
+                    <a:p>
+                      <a:r>
+                        <a:rPr lang="en-US" altLang="zh-TW" sz="2000" dirty="0" smtClean="0"/>
+                        <a:t>    Singleton* Singleton::Instance () {</a:t>
+                      </a:r>
+                    </a:p>
+                    <a:p>
+                      <a:r>
+                        <a:rPr lang="en-US" altLang="zh-TW" sz="2000" dirty="0" smtClean="0"/>
+                        <a:t>        if (_instance == 0) {</a:t>
+                      </a:r>
+                    </a:p>
+                    <a:p>
+                      <a:r>
+                        <a:rPr lang="en-US" altLang="zh-TW" sz="2000" dirty="0" smtClean="0"/>
+                        <a:t>            _instance = new Singleton;</a:t>
+                      </a:r>
+                    </a:p>
+                    <a:p>
+                      <a:r>
+                        <a:rPr lang="en-US" altLang="zh-TW" sz="2000" dirty="0" smtClean="0"/>
+                        <a:t>        }</a:t>
+                      </a:r>
+                    </a:p>
+                    <a:p>
+                      <a:r>
+                        <a:rPr lang="en-US" altLang="zh-TW" sz="2000" dirty="0" smtClean="0"/>
+                        <a:t>        return _instance;</a:t>
+                      </a:r>
+                    </a:p>
+                    <a:p>
+                      <a:r>
+                        <a:rPr lang="en-US" altLang="zh-TW" sz="2000" dirty="0" smtClean="0"/>
+                        <a:t>    }</a:t>
+                      </a:r>
+                      <a:endParaRPr lang="zh-TW" altLang="en-US" sz="2000" dirty="0"/>
+                    </a:p>
+                  </a:txBody>
+                  <a:tcPr/>
+                </a:tc>
+              </a:tr>
+            </a:tbl>
+          </a:graphicData>
+        </a:graphic>
+      </p:graphicFrame>
+      <p:sp>
+        <p:nvSpPr>
+          <p:cNvPr id="5" name="文字方塊 4"/>
+          <p:cNvSpPr txBox="1"/>
+          <p:nvPr/>
+        </p:nvSpPr>
+        <p:spPr>
+          <a:xfrm>
+            <a:off x="539552" y="4941168"/>
+            <a:ext cx="5184576" cy="523220"/>
+          </a:xfrm>
+          <a:prstGeom prst="rect">
+            <a:avLst/>
+          </a:prstGeom>
+          <a:noFill/>
+        </p:spPr>
+        <p:txBody>
+          <a:bodyPr wrap="square" rtlCol="0">
+            <a:spAutoFit/>
+          </a:bodyPr>
+          <a:lstStyle/>
+          <a:p>
+            <a:r>
+              <a:rPr lang="en-US" altLang="zh-TW" sz="2800" dirty="0" smtClean="0"/>
+              <a:t>Here</a:t>
+            </a:r>
+            <a:r>
+              <a:rPr lang="zh-TW" altLang="en-US" sz="2800" dirty="0" smtClean="0"/>
+              <a:t> </a:t>
+            </a:r>
+            <a:r>
+              <a:rPr lang="en-US" altLang="zh-TW" sz="2800" dirty="0" smtClean="0"/>
+              <a:t>should apply </a:t>
+            </a:r>
+            <a:r>
+              <a:rPr lang="en-US" altLang="zh-TW" sz="2800" dirty="0" err="1" smtClean="0"/>
+              <a:t>mutex</a:t>
+            </a:r>
+            <a:r>
+              <a:rPr lang="en-US" altLang="zh-TW" sz="2800" dirty="0" smtClean="0"/>
+              <a:t> lock</a:t>
+            </a:r>
+          </a:p>
+        </p:txBody>
+      </p:sp>
+      <p:cxnSp>
+        <p:nvCxnSpPr>
+          <p:cNvPr id="10" name="圖案 9"/>
+          <p:cNvCxnSpPr>
+            <a:stCxn id="5" idx="3"/>
+          </p:cNvCxnSpPr>
+          <p:nvPr/>
+        </p:nvCxnSpPr>
+        <p:spPr>
+          <a:xfrm flipV="1">
+            <a:off x="5724128" y="3501008"/>
+            <a:ext cx="1656184" cy="1701770"/>
+          </a:xfrm>
+          <a:prstGeom prst="bentConnector2">
+            <a:avLst/>
+          </a:prstGeom>
+          <a:ln w="28575">
+            <a:solidFill>
+              <a:srgbClr val="FF0000"/>
+            </a:solidFill>
+            <a:tailEnd type="arrow"/>
+          </a:ln>
+        </p:spPr>
+        <p:style>
+          <a:lnRef idx="1">
+            <a:schemeClr val="accent1"/>
+          </a:lnRef>
+          <a:fillRef idx="0">
+            <a:schemeClr val="accent1"/>
+          </a:fillRef>
+          <a:effectRef idx="0">
+            <a:schemeClr val="accent1"/>
+          </a:effectRef>
+          <a:fontRef idx="minor">
+            <a:schemeClr val="tx1"/>
+          </a:fontRef>
+        </p:style>
+      </p:cxnSp>
     </p:spTree>
   </p:cSld>
   <p:clrMapOvr>
@@ -7266,7 +6966,7 @@
           <a:p>
             <a:r>
               <a:rPr lang="en-US" altLang="zh-TW" dirty="0" smtClean="0"/>
-              <a:t>Implementation 1</a:t>
+              <a:t>Implementation 2 subclass</a:t>
             </a:r>
             <a:endParaRPr lang="zh-TW" altLang="en-US" dirty="0"/>
           </a:p>
@@ -7293,8 +6993,7 @@
                 <a:tableStyleId>{5C22544A-7EE6-4342-B048-85BDC9FD1C3A}</a:tableStyleId>
               </a:tblPr>
               <a:tblGrid>
-                <a:gridCol w="4114800"/>
-                <a:gridCol w="4114800"/>
+                <a:gridCol w="8229600"/>
               </a:tblGrid>
               <a:tr h="370840">
                 <a:tc>
@@ -7310,99 +7009,67 @@
                     <a:p>
                       <a:r>
                         <a:rPr lang="en-US" altLang="zh-TW" sz="2000" dirty="0" smtClean="0"/>
-                        <a:t>    public:</a:t>
+                        <a:t>  public:</a:t>
                       </a:r>
                     </a:p>
                     <a:p>
                       <a:r>
                         <a:rPr lang="en-US" altLang="zh-TW" sz="2000" dirty="0" smtClean="0"/>
-                        <a:t>        static Singleton* Instance();</a:t>
+                        <a:t>    static void Register(const char* name, Singleton*);</a:t>
                       </a:r>
                     </a:p>
                     <a:p>
                       <a:r>
                         <a:rPr lang="en-US" altLang="zh-TW" sz="2000" dirty="0" smtClean="0"/>
-                        <a:t>    protected:</a:t>
+                        <a:t>    static Singleton* Instance();</a:t>
                       </a:r>
                     </a:p>
                     <a:p>
                       <a:r>
                         <a:rPr lang="en-US" altLang="zh-TW" sz="2000" dirty="0" smtClean="0"/>
-                        <a:t>        Singleton();</a:t>
+                        <a:t>  protected:</a:t>
                       </a:r>
                     </a:p>
                     <a:p>
                       <a:r>
                         <a:rPr lang="en-US" altLang="zh-TW" sz="2000" dirty="0" smtClean="0"/>
-                        <a:t>    private:</a:t>
+                        <a:t>    static Singleton* Lookup(const char* name);</a:t>
                       </a:r>
                     </a:p>
                     <a:p>
                       <a:r>
                         <a:rPr lang="en-US" altLang="zh-TW" sz="2000" dirty="0" smtClean="0"/>
-                        <a:t>        static Singleton* _instance;</a:t>
+                        <a:t>  private:</a:t>
                       </a:r>
                     </a:p>
                     <a:p>
                       <a:r>
                         <a:rPr lang="en-US" altLang="zh-TW" sz="2000" dirty="0" smtClean="0"/>
-                        <a:t>    };</a:t>
-                      </a:r>
-                      <a:endParaRPr lang="zh-TW" altLang="en-US" sz="2000" dirty="0"/>
-                    </a:p>
-                  </a:txBody>
-                  <a:tcPr/>
-                </a:tc>
-                <a:tc>
-                  <a:txBody>
-                    <a:bodyPr/>
-                    <a:lstStyle/>
-                    <a:p>
-                      <a:r>
-                        <a:rPr lang="en-US" altLang="zh-TW" sz="2000" dirty="0" smtClean="0"/>
-                        <a:t> Singleton* Singleton::_instance = 0;</a:t>
+                        <a:t>    static Singleton* _instance;</a:t>
                       </a:r>
                     </a:p>
                     <a:p>
                       <a:r>
                         <a:rPr lang="en-US" altLang="zh-TW" sz="2000" dirty="0" smtClean="0"/>
-                        <a:t>    </a:t>
+                        <a:t>    static List&lt;</a:t>
+                      </a:r>
+                      <a:r>
+                        <a:rPr lang="en-US" altLang="zh-TW" sz="2000" dirty="0" err="1" smtClean="0"/>
+                        <a:t>NameSingletonPair</a:t>
+                      </a:r>
+                      <a:r>
+                        <a:rPr lang="en-US" altLang="zh-TW" sz="2000" dirty="0" smtClean="0"/>
+                        <a:t>&gt;* _registry;</a:t>
                       </a:r>
                     </a:p>
                     <a:p>
                       <a:r>
+                        <a:rPr lang="en-US" altLang="zh-TW" sz="2000" baseline="0" dirty="0" smtClean="0"/>
+                        <a:t>  </a:t>
+                      </a:r>
+                      <a:r>
                         <a:rPr lang="en-US" altLang="zh-TW" sz="2000" dirty="0" smtClean="0"/>
-                        <a:t>    Singleton* Singleton::Instance () {</a:t>
-                      </a:r>
-                    </a:p>
-                    <a:p>
-                      <a:r>
-                        <a:rPr lang="en-US" altLang="zh-TW" sz="2000" dirty="0" smtClean="0"/>
-                        <a:t>        if (_instance == 0) {</a:t>
-                      </a:r>
-                    </a:p>
-                    <a:p>
-                      <a:r>
-                        <a:rPr lang="en-US" altLang="zh-TW" sz="2000" dirty="0" smtClean="0"/>
-                        <a:t>            _instance = new Singleton;</a:t>
-                      </a:r>
-                    </a:p>
-                    <a:p>
-                      <a:r>
-                        <a:rPr lang="en-US" altLang="zh-TW" sz="2000" dirty="0" smtClean="0"/>
-                        <a:t>        }</a:t>
-                      </a:r>
-                    </a:p>
-                    <a:p>
-                      <a:r>
-                        <a:rPr lang="en-US" altLang="zh-TW" sz="2000" dirty="0" smtClean="0"/>
-                        <a:t>        return _instance;</a:t>
-                      </a:r>
-                    </a:p>
-                    <a:p>
-                      <a:r>
-                        <a:rPr lang="en-US" altLang="zh-TW" sz="2000" dirty="0" smtClean="0"/>
-                        <a:t>    }</a:t>
+                        <a:t>};</a:t>
                       </a:r>
                       <a:endParaRPr lang="zh-TW" altLang="en-US" sz="2000" dirty="0"/>
                     </a:p>
@@ -7414,44 +7081,6 @@
           </a:graphicData>
         </a:graphic>
       </p:graphicFrame>
-      <p:sp>
-        <p:nvSpPr>
-          <p:cNvPr id="5" name="文字方塊 4"/>
-          <p:cNvSpPr txBox="1"/>
-          <p:nvPr/>
-        </p:nvSpPr>
-        <p:spPr>
-          <a:xfrm>
-            <a:off x="539552" y="4941168"/>
-            <a:ext cx="5976664" cy="523220"/>
-          </a:xfrm>
-          <a:prstGeom prst="rect">
-            <a:avLst/>
-          </a:prstGeom>
-          <a:noFill/>
-        </p:spPr>
-        <p:txBody>
-          <a:bodyPr wrap="square" rtlCol="0">
-            <a:spAutoFit/>
-          </a:bodyPr>
-          <a:lstStyle/>
-          <a:p>
-            <a:r>
-              <a:rPr lang="en-US" altLang="zh-TW" sz="2800" dirty="0" smtClean="0"/>
-              <a:t>Put Singleton as </a:t>
-            </a:r>
-            <a:r>
-              <a:rPr lang="en-US" altLang="zh-TW" sz="2800" dirty="0" smtClean="0"/>
-              <a:t>global </a:t>
-            </a:r>
-            <a:r>
-              <a:rPr lang="en-US" altLang="zh-TW" sz="2800" dirty="0" smtClean="0"/>
-              <a:t>variable?</a:t>
-            </a:r>
-            <a:endParaRPr lang="zh-TW" altLang="en-US" sz="2800" dirty="0"/>
-          </a:p>
-        </p:txBody>
-      </p:sp>
     </p:spTree>
   </p:cSld>
   <p:clrMapOvr>

</xml_diff>